<commit_message>
Final update OOP part 2
</commit_message>
<xml_diff>
--- a/objects/part_2/python_objects_2.pptx
+++ b/objects/part_2/python_objects_2.pptx
@@ -3469,8 +3469,8 @@
           <a:lstStyle/>
           <a:p>
             <a:r>
-              <a:rPr lang="en-US" dirty="0" err="1"/>
-              <a:t>Onderwerpen</a:t>
+              <a:rPr lang="en-US" dirty="0"/>
+              <a:t>Agenda</a:t>
             </a:r>
             <a:endParaRPr lang="en-NL" dirty="0"/>
           </a:p>
@@ -3506,88 +3506,6 @@
             <a:r>
               <a:rPr lang="nl-NL" sz="2000" dirty="0"/>
               <a:t>Herhaling deel 1</a:t>
-            </a:r>
-          </a:p>
-          <a:p>
-            <a:pPr lvl="1">
-              <a:buFontTx/>
-              <a:buChar char="-"/>
-            </a:pPr>
-            <a:r>
-              <a:rPr lang="nl-NL" sz="1600" dirty="0"/>
-              <a:t>Classes en objecten.</a:t>
-            </a:r>
-          </a:p>
-          <a:p>
-            <a:pPr lvl="1">
-              <a:buFontTx/>
-              <a:buChar char="-"/>
-            </a:pPr>
-            <a:r>
-              <a:rPr lang="nl-NL" sz="1600" dirty="0"/>
-              <a:t>Attributen en methodes.</a:t>
-            </a:r>
-          </a:p>
-          <a:p>
-            <a:pPr lvl="1">
-              <a:buFontTx/>
-              <a:buChar char="-"/>
-            </a:pPr>
-            <a:r>
-              <a:rPr lang="nl-NL" sz="1600" dirty="0"/>
-              <a:t>“Magische” methodes (</a:t>
-            </a:r>
-            <a:r>
-              <a:rPr lang="nl-NL" sz="1600" dirty="0" err="1"/>
-              <a:t>dunder</a:t>
-            </a:r>
-            <a:r>
-              <a:rPr lang="nl-NL" sz="1600" dirty="0"/>
-              <a:t> </a:t>
-            </a:r>
-            <a:r>
-              <a:rPr lang="nl-NL" sz="1600" dirty="0" err="1"/>
-              <a:t>methods</a:t>
-            </a:r>
-            <a:r>
-              <a:rPr lang="nl-NL" sz="1600" dirty="0"/>
-              <a:t>).</a:t>
-            </a:r>
-          </a:p>
-          <a:p>
-            <a:pPr lvl="1">
-              <a:buFontTx/>
-              <a:buChar char="-"/>
-            </a:pPr>
-            <a:r>
-              <a:rPr lang="nl-NL" sz="1600" dirty="0"/>
-              <a:t>Publieke, private en beschermde attributen.</a:t>
-            </a:r>
-          </a:p>
-          <a:p>
-            <a:pPr lvl="1">
-              <a:buFontTx/>
-              <a:buChar char="-"/>
-            </a:pPr>
-            <a:r>
-              <a:rPr lang="nl-NL" sz="1600" dirty="0"/>
-              <a:t>Statische en klasse methodes.</a:t>
-            </a:r>
-          </a:p>
-          <a:p>
-            <a:pPr marL="457200" lvl="1" indent="0">
-              <a:buNone/>
-            </a:pPr>
-            <a:endParaRPr lang="nl-NL" sz="2000" dirty="0"/>
-          </a:p>
-          <a:p>
-            <a:pPr>
-              <a:buFontTx/>
-              <a:buChar char="-"/>
-            </a:pPr>
-            <a:r>
-              <a:rPr lang="nl-NL" sz="2000" dirty="0"/>
-              <a:t>Overerving tussen classes</a:t>
             </a:r>
           </a:p>
           <a:p>
@@ -3604,7 +3522,24 @@
             </a:pPr>
             <a:r>
               <a:rPr lang="nl-NL" sz="2000" dirty="0"/>
-              <a:t>Opzet objecten structuur</a:t>
+              <a:t>Overerving tussen classes</a:t>
+            </a:r>
+          </a:p>
+          <a:p>
+            <a:pPr>
+              <a:buFontTx/>
+              <a:buChar char="-"/>
+            </a:pPr>
+            <a:endParaRPr lang="nl-NL" sz="2000" dirty="0"/>
+          </a:p>
+          <a:p>
+            <a:pPr>
+              <a:buFontTx/>
+              <a:buChar char="-"/>
+            </a:pPr>
+            <a:r>
+              <a:rPr lang="nl-NL" sz="2000" dirty="0"/>
+              <a:t>Opzet projectstructuur</a:t>
             </a:r>
           </a:p>
           <a:p>

</xml_diff>